<commit_message>
Update Smart Gloves using Flex Sensor.pptx
</commit_message>
<xml_diff>
--- a/Smart Gloves using Flex Sensor.pptx
+++ b/Smart Gloves using Flex Sensor.pptx
@@ -5,7 +5,7 @@
     <p:sldMasterId id="2147483648" r:id="rId1"/>
   </p:sldMasterIdLst>
   <p:notesMasterIdLst>
-    <p:notesMasterId r:id="rId23"/>
+    <p:notesMasterId r:id="rId31"/>
   </p:notesMasterIdLst>
   <p:sldIdLst>
     <p:sldId id="256" r:id="rId2"/>
@@ -23,12 +23,20 @@
     <p:sldId id="269" r:id="rId14"/>
     <p:sldId id="266" r:id="rId15"/>
     <p:sldId id="270" r:id="rId16"/>
-    <p:sldId id="267" r:id="rId17"/>
-    <p:sldId id="268" r:id="rId18"/>
-    <p:sldId id="271" r:id="rId19"/>
-    <p:sldId id="272" r:id="rId20"/>
-    <p:sldId id="275" r:id="rId21"/>
-    <p:sldId id="276" r:id="rId22"/>
+    <p:sldId id="278" r:id="rId17"/>
+    <p:sldId id="277" r:id="rId18"/>
+    <p:sldId id="279" r:id="rId19"/>
+    <p:sldId id="280" r:id="rId20"/>
+    <p:sldId id="282" r:id="rId21"/>
+    <p:sldId id="281" r:id="rId22"/>
+    <p:sldId id="283" r:id="rId23"/>
+    <p:sldId id="284" r:id="rId24"/>
+    <p:sldId id="267" r:id="rId25"/>
+    <p:sldId id="268" r:id="rId26"/>
+    <p:sldId id="271" r:id="rId27"/>
+    <p:sldId id="272" r:id="rId28"/>
+    <p:sldId id="275" r:id="rId29"/>
+    <p:sldId id="276" r:id="rId30"/>
   </p:sldIdLst>
   <p:sldSz cx="12192000" cy="6858000"/>
   <p:notesSz cx="6858000" cy="9144000"/>
@@ -1278,7 +1286,7 @@
           <a:p>
             <a:fld id="{3A09F30C-BD4A-4F53-8094-1E8EEF0ED955}" type="datetimeFigureOut">
               <a:rPr lang="en-US" smtClean="0"/>
-              <a:t>5/27/2022</a:t>
+              <a:t>7/28/2022</a:t>
             </a:fld>
             <a:endParaRPr lang="en-US"/>
           </a:p>
@@ -1692,7 +1700,7 @@
           <a:p>
             <a:fld id="{16DED50F-CE44-4FEB-A0B6-020984C8B334}" type="datetime1">
               <a:rPr lang="en-US" smtClean="0"/>
-              <a:t>5/27/2022</a:t>
+              <a:t>7/28/2022</a:t>
             </a:fld>
             <a:endParaRPr lang="en-US"/>
           </a:p>
@@ -1890,7 +1898,7 @@
           <a:p>
             <a:fld id="{4993B785-5109-4F0C-8A45-1D357F8C956E}" type="datetime1">
               <a:rPr lang="en-US" smtClean="0"/>
-              <a:t>5/27/2022</a:t>
+              <a:t>7/28/2022</a:t>
             </a:fld>
             <a:endParaRPr lang="en-US"/>
           </a:p>
@@ -2098,7 +2106,7 @@
           <a:p>
             <a:fld id="{51933219-9E35-427C-8F72-9A68CF15867E}" type="datetime1">
               <a:rPr lang="en-US" smtClean="0"/>
-              <a:t>5/27/2022</a:t>
+              <a:t>7/28/2022</a:t>
             </a:fld>
             <a:endParaRPr lang="en-US"/>
           </a:p>
@@ -2296,7 +2304,7 @@
           <a:p>
             <a:fld id="{715729B3-8CCF-4A5D-A259-92F3837FB75D}" type="datetime1">
               <a:rPr lang="en-US" smtClean="0"/>
-              <a:t>5/27/2022</a:t>
+              <a:t>7/28/2022</a:t>
             </a:fld>
             <a:endParaRPr lang="en-US"/>
           </a:p>
@@ -2571,7 +2579,7 @@
           <a:p>
             <a:fld id="{62330523-CD6F-4F1F-ACB6-47645FE84133}" type="datetime1">
               <a:rPr lang="en-US" smtClean="0"/>
-              <a:t>5/27/2022</a:t>
+              <a:t>7/28/2022</a:t>
             </a:fld>
             <a:endParaRPr lang="en-US"/>
           </a:p>
@@ -2836,7 +2844,7 @@
           <a:p>
             <a:fld id="{7B3E5AFD-CBFC-4458-948E-9099193666AB}" type="datetime1">
               <a:rPr lang="en-US" smtClean="0"/>
-              <a:t>5/27/2022</a:t>
+              <a:t>7/28/2022</a:t>
             </a:fld>
             <a:endParaRPr lang="en-US"/>
           </a:p>
@@ -3248,7 +3256,7 @@
           <a:p>
             <a:fld id="{1B9F1707-E2D5-4E27-B039-49EC2082F5C5}" type="datetime1">
               <a:rPr lang="en-US" smtClean="0"/>
-              <a:t>5/27/2022</a:t>
+              <a:t>7/28/2022</a:t>
             </a:fld>
             <a:endParaRPr lang="en-US"/>
           </a:p>
@@ -3389,7 +3397,7 @@
           <a:p>
             <a:fld id="{FE9A2D3E-9B56-4FF6-B53A-0E3463CDB609}" type="datetime1">
               <a:rPr lang="en-US" smtClean="0"/>
-              <a:t>5/27/2022</a:t>
+              <a:t>7/28/2022</a:t>
             </a:fld>
             <a:endParaRPr lang="en-US"/>
           </a:p>
@@ -3502,7 +3510,7 @@
           <a:p>
             <a:fld id="{3EDABDA2-90FD-4EF1-BD28-44E6679605CC}" type="datetime1">
               <a:rPr lang="en-US" smtClean="0"/>
-              <a:t>5/27/2022</a:t>
+              <a:t>7/28/2022</a:t>
             </a:fld>
             <a:endParaRPr lang="en-US"/>
           </a:p>
@@ -3813,7 +3821,7 @@
           <a:p>
             <a:fld id="{6C600355-0254-47DB-AB4A-2DF80220E5BA}" type="datetime1">
               <a:rPr lang="en-US" smtClean="0"/>
-              <a:t>5/27/2022</a:t>
+              <a:t>7/28/2022</a:t>
             </a:fld>
             <a:endParaRPr lang="en-US"/>
           </a:p>
@@ -4101,7 +4109,7 @@
           <a:p>
             <a:fld id="{20406DAE-025E-4688-A90F-442AA99E92B6}" type="datetime1">
               <a:rPr lang="en-US" smtClean="0"/>
-              <a:t>5/27/2022</a:t>
+              <a:t>7/28/2022</a:t>
             </a:fld>
             <a:endParaRPr lang="en-US"/>
           </a:p>
@@ -4342,7 +4350,7 @@
           <a:p>
             <a:fld id="{B35FAE98-0B4E-4747-B1D0-CDF6491B9D63}" type="datetime1">
               <a:rPr lang="en-US" smtClean="0"/>
-              <a:t>5/27/2022</a:t>
+              <a:t>7/28/2022</a:t>
             </a:fld>
             <a:endParaRPr lang="en-US"/>
           </a:p>
@@ -6203,6 +6211,1133 @@
       </p:grpSpPr>
       <p:sp>
         <p:nvSpPr>
+          <p:cNvPr id="3" name="Title 2">
+            <a:extLst>
+              <a:ext uri="{FF2B5EF4-FFF2-40B4-BE49-F238E27FC236}">
+                <a16:creationId xmlns:a16="http://schemas.microsoft.com/office/drawing/2014/main" id="{490E8645-EFC2-458E-9CBE-D60AEC4689E1}"/>
+              </a:ext>
+            </a:extLst>
+          </p:cNvPr>
+          <p:cNvSpPr>
+            <a:spLocks noGrp="1"/>
+          </p:cNvSpPr>
+          <p:nvPr>
+            <p:ph type="title"/>
+          </p:nvPr>
+        </p:nvSpPr>
+        <p:spPr/>
+        <p:txBody>
+          <a:bodyPr/>
+          <a:lstStyle/>
+          <a:p>
+            <a:r>
+              <a:rPr lang="en-US" dirty="0"/>
+              <a:t>Work Progress</a:t>
+            </a:r>
+          </a:p>
+        </p:txBody>
+      </p:sp>
+      <p:sp>
+        <p:nvSpPr>
+          <p:cNvPr id="4" name="Content Placeholder 3">
+            <a:extLst>
+              <a:ext uri="{FF2B5EF4-FFF2-40B4-BE49-F238E27FC236}">
+                <a16:creationId xmlns:a16="http://schemas.microsoft.com/office/drawing/2014/main" id="{8901BC84-DD07-488B-97D8-391FE15E472C}"/>
+              </a:ext>
+            </a:extLst>
+          </p:cNvPr>
+          <p:cNvSpPr>
+            <a:spLocks noGrp="1"/>
+          </p:cNvSpPr>
+          <p:nvPr>
+            <p:ph idx="1"/>
+          </p:nvPr>
+        </p:nvSpPr>
+        <p:spPr/>
+        <p:txBody>
+          <a:bodyPr/>
+          <a:lstStyle/>
+          <a:p>
+            <a:r>
+              <a:rPr lang="en-US" dirty="0"/>
+              <a:t>Research Works</a:t>
+            </a:r>
+          </a:p>
+          <a:p>
+            <a:r>
+              <a:rPr lang="en-US" dirty="0"/>
+              <a:t>Hardware Works</a:t>
+            </a:r>
+          </a:p>
+          <a:p>
+            <a:r>
+              <a:rPr lang="en-US" dirty="0"/>
+              <a:t>Software Works</a:t>
+            </a:r>
+          </a:p>
+        </p:txBody>
+      </p:sp>
+      <p:sp>
+        <p:nvSpPr>
+          <p:cNvPr id="2" name="Slide Number Placeholder 1">
+            <a:extLst>
+              <a:ext uri="{FF2B5EF4-FFF2-40B4-BE49-F238E27FC236}">
+                <a16:creationId xmlns:a16="http://schemas.microsoft.com/office/drawing/2014/main" id="{4EDECA5C-CE1F-4EE0-AC6E-F9BB95F334FC}"/>
+              </a:ext>
+            </a:extLst>
+          </p:cNvPr>
+          <p:cNvSpPr>
+            <a:spLocks noGrp="1"/>
+          </p:cNvSpPr>
+          <p:nvPr>
+            <p:ph type="sldNum" sz="quarter" idx="12"/>
+          </p:nvPr>
+        </p:nvSpPr>
+        <p:spPr/>
+        <p:txBody>
+          <a:bodyPr/>
+          <a:lstStyle/>
+          <a:p>
+            <a:fld id="{8ABD9A93-A63E-4048-A90A-76F0C4F81214}" type="slidenum">
+              <a:rPr lang="en-US" smtClean="0"/>
+              <a:t>16</a:t>
+            </a:fld>
+            <a:endParaRPr lang="en-US"/>
+          </a:p>
+        </p:txBody>
+      </p:sp>
+    </p:spTree>
+    <p:extLst>
+      <p:ext uri="{BB962C8B-B14F-4D97-AF65-F5344CB8AC3E}">
+        <p14:creationId xmlns:p14="http://schemas.microsoft.com/office/powerpoint/2010/main" val="1579491529"/>
+      </p:ext>
+    </p:extLst>
+  </p:cSld>
+  <p:clrMapOvr>
+    <a:masterClrMapping/>
+  </p:clrMapOvr>
+</p:sld>
+</file>
+
+<file path=ppt/slides/slide17.xml><?xml version="1.0" encoding="utf-8"?>
+<p:sld xmlns:a="http://schemas.openxmlformats.org/drawingml/2006/main" xmlns:r="http://schemas.openxmlformats.org/officeDocument/2006/relationships" xmlns:p="http://schemas.openxmlformats.org/presentationml/2006/main">
+  <p:cSld>
+    <p:spTree>
+      <p:nvGrpSpPr>
+        <p:cNvPr id="1" name=""/>
+        <p:cNvGrpSpPr/>
+        <p:nvPr/>
+      </p:nvGrpSpPr>
+      <p:grpSpPr>
+        <a:xfrm>
+          <a:off x="0" y="0"/>
+          <a:ext cx="0" cy="0"/>
+          <a:chOff x="0" y="0"/>
+          <a:chExt cx="0" cy="0"/>
+        </a:xfrm>
+      </p:grpSpPr>
+      <p:sp>
+        <p:nvSpPr>
+          <p:cNvPr id="3" name="Title 2">
+            <a:extLst>
+              <a:ext uri="{FF2B5EF4-FFF2-40B4-BE49-F238E27FC236}">
+                <a16:creationId xmlns:a16="http://schemas.microsoft.com/office/drawing/2014/main" id="{C90BED33-C7DC-416B-B80B-953F14636A1E}"/>
+              </a:ext>
+            </a:extLst>
+          </p:cNvPr>
+          <p:cNvSpPr>
+            <a:spLocks noGrp="1"/>
+          </p:cNvSpPr>
+          <p:nvPr>
+            <p:ph type="ctrTitle"/>
+          </p:nvPr>
+        </p:nvSpPr>
+        <p:spPr/>
+        <p:txBody>
+          <a:bodyPr/>
+          <a:lstStyle/>
+          <a:p>
+            <a:r>
+              <a:rPr lang="en-US" dirty="0"/>
+              <a:t>Research Works</a:t>
+            </a:r>
+          </a:p>
+        </p:txBody>
+      </p:sp>
+      <p:sp>
+        <p:nvSpPr>
+          <p:cNvPr id="4" name="Subtitle 3">
+            <a:extLst>
+              <a:ext uri="{FF2B5EF4-FFF2-40B4-BE49-F238E27FC236}">
+                <a16:creationId xmlns:a16="http://schemas.microsoft.com/office/drawing/2014/main" id="{6A1215A8-419D-4106-A6DA-6B65949E660F}"/>
+              </a:ext>
+            </a:extLst>
+          </p:cNvPr>
+          <p:cNvSpPr>
+            <a:spLocks noGrp="1"/>
+          </p:cNvSpPr>
+          <p:nvPr>
+            <p:ph type="subTitle" idx="1"/>
+          </p:nvPr>
+        </p:nvSpPr>
+        <p:spPr/>
+        <p:txBody>
+          <a:bodyPr/>
+          <a:lstStyle/>
+          <a:p>
+            <a:endParaRPr lang="en-US"/>
+          </a:p>
+        </p:txBody>
+      </p:sp>
+      <p:sp>
+        <p:nvSpPr>
+          <p:cNvPr id="2" name="Slide Number Placeholder 1">
+            <a:extLst>
+              <a:ext uri="{FF2B5EF4-FFF2-40B4-BE49-F238E27FC236}">
+                <a16:creationId xmlns:a16="http://schemas.microsoft.com/office/drawing/2014/main" id="{BE45E39A-C2AC-4773-956B-8394291B360C}"/>
+              </a:ext>
+            </a:extLst>
+          </p:cNvPr>
+          <p:cNvSpPr>
+            <a:spLocks noGrp="1"/>
+          </p:cNvSpPr>
+          <p:nvPr>
+            <p:ph type="sldNum" sz="quarter" idx="12"/>
+          </p:nvPr>
+        </p:nvSpPr>
+        <p:spPr/>
+        <p:txBody>
+          <a:bodyPr/>
+          <a:lstStyle/>
+          <a:p>
+            <a:fld id="{8ABD9A93-A63E-4048-A90A-76F0C4F81214}" type="slidenum">
+              <a:rPr lang="en-US" smtClean="0"/>
+              <a:t>17</a:t>
+            </a:fld>
+            <a:endParaRPr lang="en-US"/>
+          </a:p>
+        </p:txBody>
+      </p:sp>
+    </p:spTree>
+    <p:extLst>
+      <p:ext uri="{BB962C8B-B14F-4D97-AF65-F5344CB8AC3E}">
+        <p14:creationId xmlns:p14="http://schemas.microsoft.com/office/powerpoint/2010/main" val="1675369311"/>
+      </p:ext>
+    </p:extLst>
+  </p:cSld>
+  <p:clrMapOvr>
+    <a:masterClrMapping/>
+  </p:clrMapOvr>
+</p:sld>
+</file>
+
+<file path=ppt/slides/slide18.xml><?xml version="1.0" encoding="utf-8"?>
+<p:sld xmlns:a="http://schemas.openxmlformats.org/drawingml/2006/main" xmlns:r="http://schemas.openxmlformats.org/officeDocument/2006/relationships" xmlns:p="http://schemas.openxmlformats.org/presentationml/2006/main">
+  <p:cSld>
+    <p:spTree>
+      <p:nvGrpSpPr>
+        <p:cNvPr id="1" name=""/>
+        <p:cNvGrpSpPr/>
+        <p:nvPr/>
+      </p:nvGrpSpPr>
+      <p:grpSpPr>
+        <a:xfrm>
+          <a:off x="0" y="0"/>
+          <a:ext cx="0" cy="0"/>
+          <a:chOff x="0" y="0"/>
+          <a:chExt cx="0" cy="0"/>
+        </a:xfrm>
+      </p:grpSpPr>
+      <p:sp>
+        <p:nvSpPr>
+          <p:cNvPr id="2" name="Title 1">
+            <a:extLst>
+              <a:ext uri="{FF2B5EF4-FFF2-40B4-BE49-F238E27FC236}">
+                <a16:creationId xmlns:a16="http://schemas.microsoft.com/office/drawing/2014/main" id="{3F0E235B-AAF4-4315-B44E-8001AA269205}"/>
+              </a:ext>
+            </a:extLst>
+          </p:cNvPr>
+          <p:cNvSpPr>
+            <a:spLocks noGrp="1"/>
+          </p:cNvSpPr>
+          <p:nvPr>
+            <p:ph type="title"/>
+          </p:nvPr>
+        </p:nvSpPr>
+        <p:spPr/>
+        <p:txBody>
+          <a:bodyPr/>
+          <a:lstStyle/>
+          <a:p>
+            <a:r>
+              <a:rPr lang="en-US" dirty="0"/>
+              <a:t>Why Random Forest classifier?</a:t>
+            </a:r>
+          </a:p>
+        </p:txBody>
+      </p:sp>
+      <p:sp>
+        <p:nvSpPr>
+          <p:cNvPr id="3" name="Content Placeholder 2">
+            <a:extLst>
+              <a:ext uri="{FF2B5EF4-FFF2-40B4-BE49-F238E27FC236}">
+                <a16:creationId xmlns:a16="http://schemas.microsoft.com/office/drawing/2014/main" id="{85CB37AC-9E0E-4B7A-891E-E15833EB22F4}"/>
+              </a:ext>
+            </a:extLst>
+          </p:cNvPr>
+          <p:cNvSpPr>
+            <a:spLocks noGrp="1"/>
+          </p:cNvSpPr>
+          <p:nvPr>
+            <p:ph idx="1"/>
+          </p:nvPr>
+        </p:nvSpPr>
+        <p:spPr/>
+        <p:txBody>
+          <a:bodyPr/>
+          <a:lstStyle/>
+          <a:p>
+            <a:r>
+              <a:rPr lang="en-US" dirty="0"/>
+              <a:t>Neural Networks can not be used as no threshold or bias factors are required.</a:t>
+            </a:r>
+          </a:p>
+          <a:p>
+            <a:r>
+              <a:rPr lang="en-US" dirty="0"/>
+              <a:t>Regression models requires correlation between datasets.</a:t>
+            </a:r>
+          </a:p>
+          <a:p>
+            <a:r>
+              <a:rPr lang="en-US" dirty="0"/>
+              <a:t>Support vector machine is best suited for two class problems.</a:t>
+            </a:r>
+          </a:p>
+          <a:p>
+            <a:r>
+              <a:rPr lang="en-US" dirty="0"/>
+              <a:t>K-Nearest </a:t>
+            </a:r>
+            <a:r>
+              <a:rPr lang="en-US" dirty="0" err="1"/>
+              <a:t>Neighbour</a:t>
+            </a:r>
+            <a:r>
+              <a:rPr lang="en-US" dirty="0"/>
+              <a:t> assumes similar data to be near each other.</a:t>
+            </a:r>
+          </a:p>
+          <a:p>
+            <a:r>
+              <a:rPr lang="en-US" dirty="0"/>
+              <a:t>Naïve Bayes takes a probabilistic approach but we need accuracy.</a:t>
+            </a:r>
+          </a:p>
+          <a:p>
+            <a:r>
+              <a:rPr lang="en-US" dirty="0"/>
+              <a:t> In all, Random Forest is best.</a:t>
+            </a:r>
+          </a:p>
+          <a:p>
+            <a:endParaRPr lang="en-US" dirty="0"/>
+          </a:p>
+        </p:txBody>
+      </p:sp>
+      <p:sp>
+        <p:nvSpPr>
+          <p:cNvPr id="4" name="Slide Number Placeholder 3">
+            <a:extLst>
+              <a:ext uri="{FF2B5EF4-FFF2-40B4-BE49-F238E27FC236}">
+                <a16:creationId xmlns:a16="http://schemas.microsoft.com/office/drawing/2014/main" id="{CA6DE0B3-BF39-4782-A31A-3FC3CA462BC0}"/>
+              </a:ext>
+            </a:extLst>
+          </p:cNvPr>
+          <p:cNvSpPr>
+            <a:spLocks noGrp="1"/>
+          </p:cNvSpPr>
+          <p:nvPr>
+            <p:ph type="sldNum" sz="quarter" idx="12"/>
+          </p:nvPr>
+        </p:nvSpPr>
+        <p:spPr/>
+        <p:txBody>
+          <a:bodyPr/>
+          <a:lstStyle/>
+          <a:p>
+            <a:fld id="{8ABD9A93-A63E-4048-A90A-76F0C4F81214}" type="slidenum">
+              <a:rPr lang="en-US" smtClean="0"/>
+              <a:t>18</a:t>
+            </a:fld>
+            <a:endParaRPr lang="en-US"/>
+          </a:p>
+        </p:txBody>
+      </p:sp>
+    </p:spTree>
+    <p:extLst>
+      <p:ext uri="{BB962C8B-B14F-4D97-AF65-F5344CB8AC3E}">
+        <p14:creationId xmlns:p14="http://schemas.microsoft.com/office/powerpoint/2010/main" val="3433476898"/>
+      </p:ext>
+    </p:extLst>
+  </p:cSld>
+  <p:clrMapOvr>
+    <a:masterClrMapping/>
+  </p:clrMapOvr>
+</p:sld>
+</file>
+
+<file path=ppt/slides/slide19.xml><?xml version="1.0" encoding="utf-8"?>
+<p:sld xmlns:a="http://schemas.openxmlformats.org/drawingml/2006/main" xmlns:r="http://schemas.openxmlformats.org/officeDocument/2006/relationships" xmlns:p="http://schemas.openxmlformats.org/presentationml/2006/main">
+  <p:cSld>
+    <p:spTree>
+      <p:nvGrpSpPr>
+        <p:cNvPr id="1" name=""/>
+        <p:cNvGrpSpPr/>
+        <p:nvPr/>
+      </p:nvGrpSpPr>
+      <p:grpSpPr>
+        <a:xfrm>
+          <a:off x="0" y="0"/>
+          <a:ext cx="0" cy="0"/>
+          <a:chOff x="0" y="0"/>
+          <a:chExt cx="0" cy="0"/>
+        </a:xfrm>
+      </p:grpSpPr>
+      <p:sp>
+        <p:nvSpPr>
+          <p:cNvPr id="5" name="Title 4">
+            <a:extLst>
+              <a:ext uri="{FF2B5EF4-FFF2-40B4-BE49-F238E27FC236}">
+                <a16:creationId xmlns:a16="http://schemas.microsoft.com/office/drawing/2014/main" id="{089CA0F3-F20A-4C87-B9B3-E2032266CB6D}"/>
+              </a:ext>
+            </a:extLst>
+          </p:cNvPr>
+          <p:cNvSpPr>
+            <a:spLocks noGrp="1"/>
+          </p:cNvSpPr>
+          <p:nvPr>
+            <p:ph type="ctrTitle"/>
+          </p:nvPr>
+        </p:nvSpPr>
+        <p:spPr/>
+        <p:txBody>
+          <a:bodyPr/>
+          <a:lstStyle/>
+          <a:p>
+            <a:r>
+              <a:rPr lang="en-US" dirty="0"/>
+              <a:t>Hardware Works</a:t>
+            </a:r>
+          </a:p>
+        </p:txBody>
+      </p:sp>
+      <p:sp>
+        <p:nvSpPr>
+          <p:cNvPr id="8" name="Subtitle 7">
+            <a:extLst>
+              <a:ext uri="{FF2B5EF4-FFF2-40B4-BE49-F238E27FC236}">
+                <a16:creationId xmlns:a16="http://schemas.microsoft.com/office/drawing/2014/main" id="{11CADDBF-B1F8-49B7-8EEF-57C82FA738FB}"/>
+              </a:ext>
+            </a:extLst>
+          </p:cNvPr>
+          <p:cNvSpPr>
+            <a:spLocks noGrp="1"/>
+          </p:cNvSpPr>
+          <p:nvPr>
+            <p:ph type="subTitle" idx="1"/>
+          </p:nvPr>
+        </p:nvSpPr>
+        <p:spPr/>
+        <p:txBody>
+          <a:bodyPr/>
+          <a:lstStyle/>
+          <a:p>
+            <a:endParaRPr lang="en-US"/>
+          </a:p>
+        </p:txBody>
+      </p:sp>
+      <p:sp>
+        <p:nvSpPr>
+          <p:cNvPr id="4" name="Slide Number Placeholder 3">
+            <a:extLst>
+              <a:ext uri="{FF2B5EF4-FFF2-40B4-BE49-F238E27FC236}">
+                <a16:creationId xmlns:a16="http://schemas.microsoft.com/office/drawing/2014/main" id="{5C8E13D2-20A8-4082-A101-B995DAEE8887}"/>
+              </a:ext>
+            </a:extLst>
+          </p:cNvPr>
+          <p:cNvSpPr>
+            <a:spLocks noGrp="1"/>
+          </p:cNvSpPr>
+          <p:nvPr>
+            <p:ph type="sldNum" sz="quarter" idx="12"/>
+          </p:nvPr>
+        </p:nvSpPr>
+        <p:spPr/>
+        <p:txBody>
+          <a:bodyPr/>
+          <a:lstStyle/>
+          <a:p>
+            <a:fld id="{8ABD9A93-A63E-4048-A90A-76F0C4F81214}" type="slidenum">
+              <a:rPr lang="en-US" smtClean="0"/>
+              <a:t>19</a:t>
+            </a:fld>
+            <a:endParaRPr lang="en-US"/>
+          </a:p>
+        </p:txBody>
+      </p:sp>
+    </p:spTree>
+    <p:extLst>
+      <p:ext uri="{BB962C8B-B14F-4D97-AF65-F5344CB8AC3E}">
+        <p14:creationId xmlns:p14="http://schemas.microsoft.com/office/powerpoint/2010/main" val="2045448695"/>
+      </p:ext>
+    </p:extLst>
+  </p:cSld>
+  <p:clrMapOvr>
+    <a:masterClrMapping/>
+  </p:clrMapOvr>
+</p:sld>
+</file>
+
+<file path=ppt/slides/slide2.xml><?xml version="1.0" encoding="utf-8"?>
+<p:sld xmlns:a="http://schemas.openxmlformats.org/drawingml/2006/main" xmlns:r="http://schemas.openxmlformats.org/officeDocument/2006/relationships" xmlns:p="http://schemas.openxmlformats.org/presentationml/2006/main">
+  <p:cSld>
+    <p:spTree>
+      <p:nvGrpSpPr>
+        <p:cNvPr id="1" name=""/>
+        <p:cNvGrpSpPr/>
+        <p:nvPr/>
+      </p:nvGrpSpPr>
+      <p:grpSpPr>
+        <a:xfrm>
+          <a:off x="0" y="0"/>
+          <a:ext cx="0" cy="0"/>
+          <a:chOff x="0" y="0"/>
+          <a:chExt cx="0" cy="0"/>
+        </a:xfrm>
+      </p:grpSpPr>
+      <p:sp>
+        <p:nvSpPr>
+          <p:cNvPr id="2" name="Title 1">
+            <a:extLst>
+              <a:ext uri="{FF2B5EF4-FFF2-40B4-BE49-F238E27FC236}">
+                <a16:creationId xmlns:a16="http://schemas.microsoft.com/office/drawing/2014/main" id="{41516F92-0859-499C-9F7E-8B86D284426D}"/>
+              </a:ext>
+            </a:extLst>
+          </p:cNvPr>
+          <p:cNvSpPr>
+            <a:spLocks noGrp="1"/>
+          </p:cNvSpPr>
+          <p:nvPr>
+            <p:ph type="title"/>
+          </p:nvPr>
+        </p:nvSpPr>
+        <p:spPr/>
+        <p:txBody>
+          <a:bodyPr>
+            <a:normAutofit/>
+          </a:bodyPr>
+          <a:lstStyle/>
+          <a:p>
+            <a:pPr algn="ctr"/>
+            <a:r>
+              <a:rPr lang="en-US" sz="4800" b="1" dirty="0">
+                <a:effectLst>
+                  <a:outerShdw blurRad="38100" dist="38100" dir="2700000" algn="tl">
+                    <a:srgbClr val="000000">
+                      <a:alpha val="43137"/>
+                    </a:srgbClr>
+                  </a:outerShdw>
+                </a:effectLst>
+                <a:latin typeface="Times New Roman" panose="02020603050405020304" pitchFamily="18" charset="0"/>
+                <a:cs typeface="Times New Roman" panose="02020603050405020304" pitchFamily="18" charset="0"/>
+              </a:rPr>
+              <a:t>Contents</a:t>
+            </a:r>
+          </a:p>
+        </p:txBody>
+      </p:sp>
+      <p:sp>
+        <p:nvSpPr>
+          <p:cNvPr id="3" name="Content Placeholder 2">
+            <a:extLst>
+              <a:ext uri="{FF2B5EF4-FFF2-40B4-BE49-F238E27FC236}">
+                <a16:creationId xmlns:a16="http://schemas.microsoft.com/office/drawing/2014/main" id="{9F9BAE03-EAF6-4D5D-933A-F44EA2EC3068}"/>
+              </a:ext>
+            </a:extLst>
+          </p:cNvPr>
+          <p:cNvSpPr>
+            <a:spLocks noGrp="1"/>
+          </p:cNvSpPr>
+          <p:nvPr>
+            <p:ph idx="1"/>
+          </p:nvPr>
+        </p:nvSpPr>
+        <p:spPr>
+          <a:xfrm>
+            <a:off x="1125071" y="1847850"/>
+            <a:ext cx="10515600" cy="4351338"/>
+          </a:xfrm>
+        </p:spPr>
+        <p:txBody>
+          <a:bodyPr/>
+          <a:lstStyle/>
+          <a:p>
+            <a:r>
+              <a:rPr lang="en-US" dirty="0">
+                <a:latin typeface="Times New Roman" panose="02020603050405020304" pitchFamily="18" charset="0"/>
+                <a:cs typeface="Times New Roman" panose="02020603050405020304" pitchFamily="18" charset="0"/>
+              </a:rPr>
+              <a:t>Introduction</a:t>
+            </a:r>
+          </a:p>
+          <a:p>
+            <a:r>
+              <a:rPr lang="en-US" dirty="0">
+                <a:latin typeface="Times New Roman" panose="02020603050405020304" pitchFamily="18" charset="0"/>
+                <a:cs typeface="Times New Roman" panose="02020603050405020304" pitchFamily="18" charset="0"/>
+              </a:rPr>
+              <a:t>Objectives</a:t>
+            </a:r>
+          </a:p>
+          <a:p>
+            <a:r>
+              <a:rPr lang="en-US" dirty="0">
+                <a:latin typeface="Times New Roman" panose="02020603050405020304" pitchFamily="18" charset="0"/>
+                <a:cs typeface="Times New Roman" panose="02020603050405020304" pitchFamily="18" charset="0"/>
+              </a:rPr>
+              <a:t>Problem Statement</a:t>
+            </a:r>
+          </a:p>
+          <a:p>
+            <a:r>
+              <a:rPr lang="en-US" dirty="0">
+                <a:latin typeface="Times New Roman" panose="02020603050405020304" pitchFamily="18" charset="0"/>
+                <a:cs typeface="Times New Roman" panose="02020603050405020304" pitchFamily="18" charset="0"/>
+              </a:rPr>
+              <a:t>Applications</a:t>
+            </a:r>
+          </a:p>
+          <a:p>
+            <a:r>
+              <a:rPr lang="en-US" dirty="0">
+                <a:latin typeface="Times New Roman" panose="02020603050405020304" pitchFamily="18" charset="0"/>
+                <a:cs typeface="Times New Roman" panose="02020603050405020304" pitchFamily="18" charset="0"/>
+              </a:rPr>
+              <a:t>Methodology</a:t>
+            </a:r>
+          </a:p>
+          <a:p>
+            <a:r>
+              <a:rPr lang="en-US" dirty="0">
+                <a:latin typeface="Times New Roman" panose="02020603050405020304" pitchFamily="18" charset="0"/>
+                <a:cs typeface="Times New Roman" panose="02020603050405020304" pitchFamily="18" charset="0"/>
+              </a:rPr>
+              <a:t>Gantt Chart</a:t>
+            </a:r>
+          </a:p>
+          <a:p>
+            <a:r>
+              <a:rPr lang="en-US" dirty="0">
+                <a:latin typeface="Times New Roman" panose="02020603050405020304" pitchFamily="18" charset="0"/>
+                <a:cs typeface="Times New Roman" panose="02020603050405020304" pitchFamily="18" charset="0"/>
+              </a:rPr>
+              <a:t>Expected Output</a:t>
+            </a:r>
+          </a:p>
+        </p:txBody>
+      </p:sp>
+      <p:sp>
+        <p:nvSpPr>
+          <p:cNvPr id="4" name="Slide Number Placeholder 3">
+            <a:extLst>
+              <a:ext uri="{FF2B5EF4-FFF2-40B4-BE49-F238E27FC236}">
+                <a16:creationId xmlns:a16="http://schemas.microsoft.com/office/drawing/2014/main" id="{FD1D6C57-0164-A4C7-B968-D5EFB90A82F3}"/>
+              </a:ext>
+            </a:extLst>
+          </p:cNvPr>
+          <p:cNvSpPr>
+            <a:spLocks noGrp="1"/>
+          </p:cNvSpPr>
+          <p:nvPr>
+            <p:ph type="sldNum" sz="quarter" idx="12"/>
+          </p:nvPr>
+        </p:nvSpPr>
+        <p:spPr/>
+        <p:txBody>
+          <a:bodyPr/>
+          <a:lstStyle/>
+          <a:p>
+            <a:fld id="{8ABD9A93-A63E-4048-A90A-76F0C4F81214}" type="slidenum">
+              <a:rPr lang="en-US" smtClean="0"/>
+              <a:t>2</a:t>
+            </a:fld>
+            <a:endParaRPr lang="en-US"/>
+          </a:p>
+        </p:txBody>
+      </p:sp>
+    </p:spTree>
+    <p:extLst>
+      <p:ext uri="{BB962C8B-B14F-4D97-AF65-F5344CB8AC3E}">
+        <p14:creationId xmlns:p14="http://schemas.microsoft.com/office/powerpoint/2010/main" val="138582175"/>
+      </p:ext>
+    </p:extLst>
+  </p:cSld>
+  <p:clrMapOvr>
+    <a:masterClrMapping/>
+  </p:clrMapOvr>
+</p:sld>
+</file>
+
+<file path=ppt/slides/slide20.xml><?xml version="1.0" encoding="utf-8"?>
+<p:sld xmlns:a="http://schemas.openxmlformats.org/drawingml/2006/main" xmlns:r="http://schemas.openxmlformats.org/officeDocument/2006/relationships" xmlns:p="http://schemas.openxmlformats.org/presentationml/2006/main">
+  <p:cSld>
+    <p:spTree>
+      <p:nvGrpSpPr>
+        <p:cNvPr id="1" name=""/>
+        <p:cNvGrpSpPr/>
+        <p:nvPr/>
+      </p:nvGrpSpPr>
+      <p:grpSpPr>
+        <a:xfrm>
+          <a:off x="0" y="0"/>
+          <a:ext cx="0" cy="0"/>
+          <a:chOff x="0" y="0"/>
+          <a:chExt cx="0" cy="0"/>
+        </a:xfrm>
+      </p:grpSpPr>
+      <p:sp>
+        <p:nvSpPr>
+          <p:cNvPr id="2" name="Title 1">
+            <a:extLst>
+              <a:ext uri="{FF2B5EF4-FFF2-40B4-BE49-F238E27FC236}">
+                <a16:creationId xmlns:a16="http://schemas.microsoft.com/office/drawing/2014/main" id="{9837C9B9-C9F8-4E1E-A761-182FB832A8F9}"/>
+              </a:ext>
+            </a:extLst>
+          </p:cNvPr>
+          <p:cNvSpPr>
+            <a:spLocks noGrp="1"/>
+          </p:cNvSpPr>
+          <p:nvPr>
+            <p:ph type="title"/>
+          </p:nvPr>
+        </p:nvSpPr>
+        <p:spPr/>
+        <p:txBody>
+          <a:bodyPr/>
+          <a:lstStyle/>
+          <a:p>
+            <a:r>
+              <a:rPr lang="en-US" dirty="0"/>
+              <a:t>Basic Interfacing</a:t>
+            </a:r>
+          </a:p>
+        </p:txBody>
+      </p:sp>
+      <p:sp>
+        <p:nvSpPr>
+          <p:cNvPr id="3" name="Content Placeholder 2">
+            <a:extLst>
+              <a:ext uri="{FF2B5EF4-FFF2-40B4-BE49-F238E27FC236}">
+                <a16:creationId xmlns:a16="http://schemas.microsoft.com/office/drawing/2014/main" id="{70B7AE18-A6B2-4665-B2A7-DB34DE025DA1}"/>
+              </a:ext>
+            </a:extLst>
+          </p:cNvPr>
+          <p:cNvSpPr>
+            <a:spLocks noGrp="1"/>
+          </p:cNvSpPr>
+          <p:nvPr>
+            <p:ph idx="1"/>
+          </p:nvPr>
+        </p:nvSpPr>
+        <p:spPr/>
+        <p:txBody>
+          <a:bodyPr/>
+          <a:lstStyle/>
+          <a:p>
+            <a:endParaRPr lang="en-US" dirty="0"/>
+          </a:p>
+        </p:txBody>
+      </p:sp>
+      <p:sp>
+        <p:nvSpPr>
+          <p:cNvPr id="4" name="Slide Number Placeholder 3">
+            <a:extLst>
+              <a:ext uri="{FF2B5EF4-FFF2-40B4-BE49-F238E27FC236}">
+                <a16:creationId xmlns:a16="http://schemas.microsoft.com/office/drawing/2014/main" id="{D90F8CBF-9E23-490C-88E3-B60DB4C0FC7F}"/>
+              </a:ext>
+            </a:extLst>
+          </p:cNvPr>
+          <p:cNvSpPr>
+            <a:spLocks noGrp="1"/>
+          </p:cNvSpPr>
+          <p:nvPr>
+            <p:ph type="sldNum" sz="quarter" idx="12"/>
+          </p:nvPr>
+        </p:nvSpPr>
+        <p:spPr/>
+        <p:txBody>
+          <a:bodyPr/>
+          <a:lstStyle/>
+          <a:p>
+            <a:fld id="{8ABD9A93-A63E-4048-A90A-76F0C4F81214}" type="slidenum">
+              <a:rPr lang="en-US" smtClean="0"/>
+              <a:t>20</a:t>
+            </a:fld>
+            <a:endParaRPr lang="en-US"/>
+          </a:p>
+        </p:txBody>
+      </p:sp>
+    </p:spTree>
+    <p:extLst>
+      <p:ext uri="{BB962C8B-B14F-4D97-AF65-F5344CB8AC3E}">
+        <p14:creationId xmlns:p14="http://schemas.microsoft.com/office/powerpoint/2010/main" val="2604221188"/>
+      </p:ext>
+    </p:extLst>
+  </p:cSld>
+  <p:clrMapOvr>
+    <a:masterClrMapping/>
+  </p:clrMapOvr>
+</p:sld>
+</file>
+
+<file path=ppt/slides/slide21.xml><?xml version="1.0" encoding="utf-8"?>
+<p:sld xmlns:a="http://schemas.openxmlformats.org/drawingml/2006/main" xmlns:r="http://schemas.openxmlformats.org/officeDocument/2006/relationships" xmlns:p="http://schemas.openxmlformats.org/presentationml/2006/main">
+  <p:cSld>
+    <p:spTree>
+      <p:nvGrpSpPr>
+        <p:cNvPr id="1" name=""/>
+        <p:cNvGrpSpPr/>
+        <p:nvPr/>
+      </p:nvGrpSpPr>
+      <p:grpSpPr>
+        <a:xfrm>
+          <a:off x="0" y="0"/>
+          <a:ext cx="0" cy="0"/>
+          <a:chOff x="0" y="0"/>
+          <a:chExt cx="0" cy="0"/>
+        </a:xfrm>
+      </p:grpSpPr>
+      <p:sp>
+        <p:nvSpPr>
+          <p:cNvPr id="2" name="Title 1">
+            <a:extLst>
+              <a:ext uri="{FF2B5EF4-FFF2-40B4-BE49-F238E27FC236}">
+                <a16:creationId xmlns:a16="http://schemas.microsoft.com/office/drawing/2014/main" id="{FB65B21F-A37B-4D74-B438-F9D66ECC52C2}"/>
+              </a:ext>
+            </a:extLst>
+          </p:cNvPr>
+          <p:cNvSpPr>
+            <a:spLocks noGrp="1"/>
+          </p:cNvSpPr>
+          <p:nvPr>
+            <p:ph type="title"/>
+          </p:nvPr>
+        </p:nvSpPr>
+        <p:spPr/>
+        <p:txBody>
+          <a:bodyPr/>
+          <a:lstStyle/>
+          <a:p>
+            <a:endParaRPr lang="en-US"/>
+          </a:p>
+        </p:txBody>
+      </p:sp>
+      <p:sp>
+        <p:nvSpPr>
+          <p:cNvPr id="3" name="Slide Number Placeholder 2">
+            <a:extLst>
+              <a:ext uri="{FF2B5EF4-FFF2-40B4-BE49-F238E27FC236}">
+                <a16:creationId xmlns:a16="http://schemas.microsoft.com/office/drawing/2014/main" id="{120EEDD4-3D81-4641-94A8-2E7D4F5C2DDB}"/>
+              </a:ext>
+            </a:extLst>
+          </p:cNvPr>
+          <p:cNvSpPr>
+            <a:spLocks noGrp="1"/>
+          </p:cNvSpPr>
+          <p:nvPr>
+            <p:ph type="sldNum" sz="quarter" idx="12"/>
+          </p:nvPr>
+        </p:nvSpPr>
+        <p:spPr/>
+        <p:txBody>
+          <a:bodyPr/>
+          <a:lstStyle/>
+          <a:p>
+            <a:fld id="{8ABD9A93-A63E-4048-A90A-76F0C4F81214}" type="slidenum">
+              <a:rPr lang="en-US" smtClean="0"/>
+              <a:t>21</a:t>
+            </a:fld>
+            <a:endParaRPr lang="en-US"/>
+          </a:p>
+        </p:txBody>
+      </p:sp>
+    </p:spTree>
+    <p:extLst>
+      <p:ext uri="{BB962C8B-B14F-4D97-AF65-F5344CB8AC3E}">
+        <p14:creationId xmlns:p14="http://schemas.microsoft.com/office/powerpoint/2010/main" val="3454568677"/>
+      </p:ext>
+    </p:extLst>
+  </p:cSld>
+  <p:clrMapOvr>
+    <a:masterClrMapping/>
+  </p:clrMapOvr>
+</p:sld>
+</file>
+
+<file path=ppt/slides/slide22.xml><?xml version="1.0" encoding="utf-8"?>
+<p:sld xmlns:a="http://schemas.openxmlformats.org/drawingml/2006/main" xmlns:r="http://schemas.openxmlformats.org/officeDocument/2006/relationships" xmlns:p="http://schemas.openxmlformats.org/presentationml/2006/main">
+  <p:cSld>
+    <p:spTree>
+      <p:nvGrpSpPr>
+        <p:cNvPr id="1" name=""/>
+        <p:cNvGrpSpPr/>
+        <p:nvPr/>
+      </p:nvGrpSpPr>
+      <p:grpSpPr>
+        <a:xfrm>
+          <a:off x="0" y="0"/>
+          <a:ext cx="0" cy="0"/>
+          <a:chOff x="0" y="0"/>
+          <a:chExt cx="0" cy="0"/>
+        </a:xfrm>
+      </p:grpSpPr>
+      <p:sp>
+        <p:nvSpPr>
+          <p:cNvPr id="2" name="Title 1">
+            <a:extLst>
+              <a:ext uri="{FF2B5EF4-FFF2-40B4-BE49-F238E27FC236}">
+                <a16:creationId xmlns:a16="http://schemas.microsoft.com/office/drawing/2014/main" id="{13485241-C18F-49A1-B5BB-0AD67B9A130B}"/>
+              </a:ext>
+            </a:extLst>
+          </p:cNvPr>
+          <p:cNvSpPr>
+            <a:spLocks noGrp="1"/>
+          </p:cNvSpPr>
+          <p:nvPr>
+            <p:ph type="ctrTitle"/>
+          </p:nvPr>
+        </p:nvSpPr>
+        <p:spPr/>
+        <p:txBody>
+          <a:bodyPr/>
+          <a:lstStyle/>
+          <a:p>
+            <a:r>
+              <a:rPr lang="en-US" dirty="0"/>
+              <a:t>Software Works</a:t>
+            </a:r>
+          </a:p>
+        </p:txBody>
+      </p:sp>
+      <p:sp>
+        <p:nvSpPr>
+          <p:cNvPr id="4" name="Subtitle 3">
+            <a:extLst>
+              <a:ext uri="{FF2B5EF4-FFF2-40B4-BE49-F238E27FC236}">
+                <a16:creationId xmlns:a16="http://schemas.microsoft.com/office/drawing/2014/main" id="{B3E1F7C1-3AFA-4DDD-857C-9C50BB1EB088}"/>
+              </a:ext>
+            </a:extLst>
+          </p:cNvPr>
+          <p:cNvSpPr>
+            <a:spLocks noGrp="1"/>
+          </p:cNvSpPr>
+          <p:nvPr>
+            <p:ph type="subTitle" idx="1"/>
+          </p:nvPr>
+        </p:nvSpPr>
+        <p:spPr/>
+        <p:txBody>
+          <a:bodyPr/>
+          <a:lstStyle/>
+          <a:p>
+            <a:endParaRPr lang="en-US"/>
+          </a:p>
+        </p:txBody>
+      </p:sp>
+      <p:sp>
+        <p:nvSpPr>
+          <p:cNvPr id="3" name="Slide Number Placeholder 2">
+            <a:extLst>
+              <a:ext uri="{FF2B5EF4-FFF2-40B4-BE49-F238E27FC236}">
+                <a16:creationId xmlns:a16="http://schemas.microsoft.com/office/drawing/2014/main" id="{EF57AC2E-C26B-4E0E-B811-EDF0C625F38D}"/>
+              </a:ext>
+            </a:extLst>
+          </p:cNvPr>
+          <p:cNvSpPr>
+            <a:spLocks noGrp="1"/>
+          </p:cNvSpPr>
+          <p:nvPr>
+            <p:ph type="sldNum" sz="quarter" idx="12"/>
+          </p:nvPr>
+        </p:nvSpPr>
+        <p:spPr/>
+        <p:txBody>
+          <a:bodyPr/>
+          <a:lstStyle/>
+          <a:p>
+            <a:fld id="{8ABD9A93-A63E-4048-A90A-76F0C4F81214}" type="slidenum">
+              <a:rPr lang="en-US" smtClean="0"/>
+              <a:t>22</a:t>
+            </a:fld>
+            <a:endParaRPr lang="en-US"/>
+          </a:p>
+        </p:txBody>
+      </p:sp>
+    </p:spTree>
+    <p:extLst>
+      <p:ext uri="{BB962C8B-B14F-4D97-AF65-F5344CB8AC3E}">
+        <p14:creationId xmlns:p14="http://schemas.microsoft.com/office/powerpoint/2010/main" val="1020056166"/>
+      </p:ext>
+    </p:extLst>
+  </p:cSld>
+  <p:clrMapOvr>
+    <a:masterClrMapping/>
+  </p:clrMapOvr>
+</p:sld>
+</file>
+
+<file path=ppt/slides/slide23.xml><?xml version="1.0" encoding="utf-8"?>
+<p:sld xmlns:a="http://schemas.openxmlformats.org/drawingml/2006/main" xmlns:r="http://schemas.openxmlformats.org/officeDocument/2006/relationships" xmlns:p="http://schemas.openxmlformats.org/presentationml/2006/main">
+  <p:cSld>
+    <p:spTree>
+      <p:nvGrpSpPr>
+        <p:cNvPr id="1" name=""/>
+        <p:cNvGrpSpPr/>
+        <p:nvPr/>
+      </p:nvGrpSpPr>
+      <p:grpSpPr>
+        <a:xfrm>
+          <a:off x="0" y="0"/>
+          <a:ext cx="0" cy="0"/>
+          <a:chOff x="0" y="0"/>
+          <a:chExt cx="0" cy="0"/>
+        </a:xfrm>
+      </p:grpSpPr>
+      <p:sp>
+        <p:nvSpPr>
+          <p:cNvPr id="2" name="Title 1">
+            <a:extLst>
+              <a:ext uri="{FF2B5EF4-FFF2-40B4-BE49-F238E27FC236}">
+                <a16:creationId xmlns:a16="http://schemas.microsoft.com/office/drawing/2014/main" id="{C117DBB7-DA4E-48AA-A6B8-4426039084B0}"/>
+              </a:ext>
+            </a:extLst>
+          </p:cNvPr>
+          <p:cNvSpPr>
+            <a:spLocks noGrp="1"/>
+          </p:cNvSpPr>
+          <p:nvPr>
+            <p:ph type="title"/>
+          </p:nvPr>
+        </p:nvSpPr>
+        <p:spPr/>
+        <p:txBody>
+          <a:bodyPr/>
+          <a:lstStyle/>
+          <a:p>
+            <a:r>
+              <a:rPr lang="en-US" dirty="0"/>
+              <a:t>Random Forest Implementation</a:t>
+            </a:r>
+          </a:p>
+        </p:txBody>
+      </p:sp>
+      <p:pic>
+        <p:nvPicPr>
+          <p:cNvPr id="6" name="Content Placeholder 5">
+            <a:extLst>
+              <a:ext uri="{FF2B5EF4-FFF2-40B4-BE49-F238E27FC236}">
+                <a16:creationId xmlns:a16="http://schemas.microsoft.com/office/drawing/2014/main" id="{52607CF3-921B-46B4-9AAD-53811FC989C9}"/>
+              </a:ext>
+            </a:extLst>
+          </p:cNvPr>
+          <p:cNvPicPr>
+            <a:picLocks noGrp="1" noChangeAspect="1"/>
+          </p:cNvPicPr>
+          <p:nvPr>
+            <p:ph idx="1"/>
+          </p:nvPr>
+        </p:nvPicPr>
+        <p:blipFill>
+          <a:blip r:embed="rId2">
+            <a:extLst>
+              <a:ext uri="{28A0092B-C50C-407E-A947-70E740481C1C}">
+                <a14:useLocalDpi xmlns:a14="http://schemas.microsoft.com/office/drawing/2010/main" val="0"/>
+              </a:ext>
+            </a:extLst>
+          </a:blip>
+          <a:stretch>
+            <a:fillRect/>
+          </a:stretch>
+        </p:blipFill>
+        <p:spPr>
+          <a:xfrm>
+            <a:off x="4535267" y="1825625"/>
+            <a:ext cx="3121466" cy="4351338"/>
+          </a:xfrm>
+        </p:spPr>
+      </p:pic>
+      <p:sp>
+        <p:nvSpPr>
+          <p:cNvPr id="4" name="Slide Number Placeholder 3">
+            <a:extLst>
+              <a:ext uri="{FF2B5EF4-FFF2-40B4-BE49-F238E27FC236}">
+                <a16:creationId xmlns:a16="http://schemas.microsoft.com/office/drawing/2014/main" id="{356965B0-14CD-4948-8BAA-260E77ECE5CD}"/>
+              </a:ext>
+            </a:extLst>
+          </p:cNvPr>
+          <p:cNvSpPr>
+            <a:spLocks noGrp="1"/>
+          </p:cNvSpPr>
+          <p:nvPr>
+            <p:ph type="sldNum" sz="quarter" idx="12"/>
+          </p:nvPr>
+        </p:nvSpPr>
+        <p:spPr/>
+        <p:txBody>
+          <a:bodyPr/>
+          <a:lstStyle/>
+          <a:p>
+            <a:fld id="{8ABD9A93-A63E-4048-A90A-76F0C4F81214}" type="slidenum">
+              <a:rPr lang="en-US" smtClean="0"/>
+              <a:t>23</a:t>
+            </a:fld>
+            <a:endParaRPr lang="en-US"/>
+          </a:p>
+        </p:txBody>
+      </p:sp>
+    </p:spTree>
+    <p:extLst>
+      <p:ext uri="{BB962C8B-B14F-4D97-AF65-F5344CB8AC3E}">
+        <p14:creationId xmlns:p14="http://schemas.microsoft.com/office/powerpoint/2010/main" val="315130164"/>
+      </p:ext>
+    </p:extLst>
+  </p:cSld>
+  <p:clrMapOvr>
+    <a:masterClrMapping/>
+  </p:clrMapOvr>
+</p:sld>
+</file>
+
+<file path=ppt/slides/slide24.xml><?xml version="1.0" encoding="utf-8"?>
+<p:sld xmlns:a="http://schemas.openxmlformats.org/drawingml/2006/main" xmlns:r="http://schemas.openxmlformats.org/officeDocument/2006/relationships" xmlns:p="http://schemas.openxmlformats.org/presentationml/2006/main">
+  <p:cSld>
+    <p:spTree>
+      <p:nvGrpSpPr>
+        <p:cNvPr id="1" name=""/>
+        <p:cNvGrpSpPr/>
+        <p:nvPr/>
+      </p:nvGrpSpPr>
+      <p:grpSpPr>
+        <a:xfrm>
+          <a:off x="0" y="0"/>
+          <a:ext cx="0" cy="0"/>
+          <a:chOff x="0" y="0"/>
+          <a:chExt cx="0" cy="0"/>
+        </a:xfrm>
+      </p:grpSpPr>
+      <p:sp>
+        <p:nvSpPr>
           <p:cNvPr id="2" name="Title 1">
             <a:extLst>
               <a:ext uri="{FF2B5EF4-FFF2-40B4-BE49-F238E27FC236}">
@@ -6269,7 +7404,7 @@
           <a:p>
             <a:fld id="{8ABD9A93-A63E-4048-A90A-76F0C4F81214}" type="slidenum">
               <a:rPr lang="en-US" smtClean="0"/>
-              <a:t>16</a:t>
+              <a:t>24</a:t>
             </a:fld>
             <a:endParaRPr lang="en-US"/>
           </a:p>
@@ -6407,7 +7542,7 @@
 </p:sld>
 </file>
 
-<file path=ppt/slides/slide17.xml><?xml version="1.0" encoding="utf-8"?>
+<file path=ppt/slides/slide25.xml><?xml version="1.0" encoding="utf-8"?>
 <p:sld xmlns:a="http://schemas.openxmlformats.org/drawingml/2006/main" xmlns:r="http://schemas.openxmlformats.org/officeDocument/2006/relationships" xmlns:p="http://schemas.openxmlformats.org/presentationml/2006/main">
   <p:cSld>
     <p:spTree>
@@ -6498,7 +7633,7 @@
           <a:p>
             <a:fld id="{8ABD9A93-A63E-4048-A90A-76F0C4F81214}" type="slidenum">
               <a:rPr lang="en-US" smtClean="0"/>
-              <a:t>17</a:t>
+              <a:t>25</a:t>
             </a:fld>
             <a:endParaRPr lang="en-US"/>
           </a:p>
@@ -6517,7 +7652,7 @@
 </p:sld>
 </file>
 
-<file path=ppt/slides/slide18.xml><?xml version="1.0" encoding="utf-8"?>
+<file path=ppt/slides/slide26.xml><?xml version="1.0" encoding="utf-8"?>
 <p:sld xmlns:a="http://schemas.openxmlformats.org/drawingml/2006/main" xmlns:r="http://schemas.openxmlformats.org/officeDocument/2006/relationships" xmlns:p="http://schemas.openxmlformats.org/presentationml/2006/main">
   <p:cSld>
     <p:spTree>
@@ -6592,7 +7727,7 @@
           <a:p>
             <a:fld id="{8ABD9A93-A63E-4048-A90A-76F0C4F81214}" type="slidenum">
               <a:rPr lang="en-US" smtClean="0"/>
-              <a:t>18</a:t>
+              <a:t>26</a:t>
             </a:fld>
             <a:endParaRPr lang="en-US"/>
           </a:p>
@@ -6694,7 +7829,7 @@
 </p:sld>
 </file>
 
-<file path=ppt/slides/slide19.xml><?xml version="1.0" encoding="utf-8"?>
+<file path=ppt/slides/slide27.xml><?xml version="1.0" encoding="utf-8"?>
 <p:sld xmlns:a="http://schemas.openxmlformats.org/drawingml/2006/main" xmlns:r="http://schemas.openxmlformats.org/officeDocument/2006/relationships" xmlns:p="http://schemas.openxmlformats.org/presentationml/2006/main">
   <p:cSld>
     <p:spTree>
@@ -6770,7 +7905,7 @@
           <a:p>
             <a:fld id="{8ABD9A93-A63E-4048-A90A-76F0C4F81214}" type="slidenum">
               <a:rPr lang="en-US" smtClean="0"/>
-              <a:t>19</a:t>
+              <a:t>27</a:t>
             </a:fld>
             <a:endParaRPr lang="en-US"/>
           </a:p>
@@ -6872,197 +8007,7 @@
 </p:sld>
 </file>
 
-<file path=ppt/slides/slide2.xml><?xml version="1.0" encoding="utf-8"?>
-<p:sld xmlns:a="http://schemas.openxmlformats.org/drawingml/2006/main" xmlns:r="http://schemas.openxmlformats.org/officeDocument/2006/relationships" xmlns:p="http://schemas.openxmlformats.org/presentationml/2006/main">
-  <p:cSld>
-    <p:spTree>
-      <p:nvGrpSpPr>
-        <p:cNvPr id="1" name=""/>
-        <p:cNvGrpSpPr/>
-        <p:nvPr/>
-      </p:nvGrpSpPr>
-      <p:grpSpPr>
-        <a:xfrm>
-          <a:off x="0" y="0"/>
-          <a:ext cx="0" cy="0"/>
-          <a:chOff x="0" y="0"/>
-          <a:chExt cx="0" cy="0"/>
-        </a:xfrm>
-      </p:grpSpPr>
-      <p:sp>
-        <p:nvSpPr>
-          <p:cNvPr id="2" name="Title 1">
-            <a:extLst>
-              <a:ext uri="{FF2B5EF4-FFF2-40B4-BE49-F238E27FC236}">
-                <a16:creationId xmlns:a16="http://schemas.microsoft.com/office/drawing/2014/main" id="{41516F92-0859-499C-9F7E-8B86D284426D}"/>
-              </a:ext>
-            </a:extLst>
-          </p:cNvPr>
-          <p:cNvSpPr>
-            <a:spLocks noGrp="1"/>
-          </p:cNvSpPr>
-          <p:nvPr>
-            <p:ph type="title"/>
-          </p:nvPr>
-        </p:nvSpPr>
-        <p:spPr/>
-        <p:txBody>
-          <a:bodyPr>
-            <a:normAutofit/>
-          </a:bodyPr>
-          <a:lstStyle/>
-          <a:p>
-            <a:pPr algn="ctr"/>
-            <a:r>
-              <a:rPr lang="en-US" sz="4800" b="1" dirty="0">
-                <a:effectLst>
-                  <a:outerShdw blurRad="38100" dist="38100" dir="2700000" algn="tl">
-                    <a:srgbClr val="000000">
-                      <a:alpha val="43137"/>
-                    </a:srgbClr>
-                  </a:outerShdw>
-                </a:effectLst>
-                <a:latin typeface="Times New Roman" panose="02020603050405020304" pitchFamily="18" charset="0"/>
-                <a:cs typeface="Times New Roman" panose="02020603050405020304" pitchFamily="18" charset="0"/>
-              </a:rPr>
-              <a:t>Contents</a:t>
-            </a:r>
-          </a:p>
-        </p:txBody>
-      </p:sp>
-      <p:sp>
-        <p:nvSpPr>
-          <p:cNvPr id="3" name="Content Placeholder 2">
-            <a:extLst>
-              <a:ext uri="{FF2B5EF4-FFF2-40B4-BE49-F238E27FC236}">
-                <a16:creationId xmlns:a16="http://schemas.microsoft.com/office/drawing/2014/main" id="{9F9BAE03-EAF6-4D5D-933A-F44EA2EC3068}"/>
-              </a:ext>
-            </a:extLst>
-          </p:cNvPr>
-          <p:cNvSpPr>
-            <a:spLocks noGrp="1"/>
-          </p:cNvSpPr>
-          <p:nvPr>
-            <p:ph idx="1"/>
-          </p:nvPr>
-        </p:nvSpPr>
-        <p:spPr>
-          <a:xfrm>
-            <a:off x="1125071" y="1847850"/>
-            <a:ext cx="10515600" cy="4351338"/>
-          </a:xfrm>
-        </p:spPr>
-        <p:txBody>
-          <a:bodyPr/>
-          <a:lstStyle/>
-          <a:p>
-            <a:r>
-              <a:rPr lang="en-US" dirty="0">
-                <a:latin typeface="Times New Roman" panose="02020603050405020304" pitchFamily="18" charset="0"/>
-                <a:cs typeface="Times New Roman" panose="02020603050405020304" pitchFamily="18" charset="0"/>
-              </a:rPr>
-              <a:t>Introduction</a:t>
-            </a:r>
-          </a:p>
-          <a:p>
-            <a:r>
-              <a:rPr lang="en-US" dirty="0">
-                <a:latin typeface="Times New Roman" panose="02020603050405020304" pitchFamily="18" charset="0"/>
-                <a:cs typeface="Times New Roman" panose="02020603050405020304" pitchFamily="18" charset="0"/>
-              </a:rPr>
-              <a:t>Objectives</a:t>
-            </a:r>
-          </a:p>
-          <a:p>
-            <a:r>
-              <a:rPr lang="en-US" dirty="0">
-                <a:latin typeface="Times New Roman" panose="02020603050405020304" pitchFamily="18" charset="0"/>
-                <a:cs typeface="Times New Roman" panose="02020603050405020304" pitchFamily="18" charset="0"/>
-              </a:rPr>
-              <a:t>Problem Statement</a:t>
-            </a:r>
-          </a:p>
-          <a:p>
-            <a:r>
-              <a:rPr lang="en-US" dirty="0">
-                <a:latin typeface="Times New Roman" panose="02020603050405020304" pitchFamily="18" charset="0"/>
-                <a:cs typeface="Times New Roman" panose="02020603050405020304" pitchFamily="18" charset="0"/>
-              </a:rPr>
-              <a:t>Applications</a:t>
-            </a:r>
-          </a:p>
-          <a:p>
-            <a:r>
-              <a:rPr lang="en-US" dirty="0">
-                <a:latin typeface="Times New Roman" panose="02020603050405020304" pitchFamily="18" charset="0"/>
-                <a:cs typeface="Times New Roman" panose="02020603050405020304" pitchFamily="18" charset="0"/>
-              </a:rPr>
-              <a:t>Methodology</a:t>
-            </a:r>
-          </a:p>
-          <a:p>
-            <a:r>
-              <a:rPr lang="en-US" dirty="0">
-                <a:latin typeface="Times New Roman" panose="02020603050405020304" pitchFamily="18" charset="0"/>
-                <a:cs typeface="Times New Roman" panose="02020603050405020304" pitchFamily="18" charset="0"/>
-              </a:rPr>
-              <a:t>Gantt Chart</a:t>
-            </a:r>
-          </a:p>
-          <a:p>
-            <a:r>
-              <a:rPr lang="en-US" dirty="0">
-                <a:latin typeface="Times New Roman" panose="02020603050405020304" pitchFamily="18" charset="0"/>
-                <a:cs typeface="Times New Roman" panose="02020603050405020304" pitchFamily="18" charset="0"/>
-              </a:rPr>
-              <a:t>Expected Output</a:t>
-            </a:r>
-          </a:p>
-        </p:txBody>
-      </p:sp>
-      <p:sp>
-        <p:nvSpPr>
-          <p:cNvPr id="4" name="Slide Number Placeholder 3">
-            <a:extLst>
-              <a:ext uri="{FF2B5EF4-FFF2-40B4-BE49-F238E27FC236}">
-                <a16:creationId xmlns:a16="http://schemas.microsoft.com/office/drawing/2014/main" id="{FD1D6C57-0164-A4C7-B968-D5EFB90A82F3}"/>
-              </a:ext>
-            </a:extLst>
-          </p:cNvPr>
-          <p:cNvSpPr>
-            <a:spLocks noGrp="1"/>
-          </p:cNvSpPr>
-          <p:nvPr>
-            <p:ph type="sldNum" sz="quarter" idx="12"/>
-          </p:nvPr>
-        </p:nvSpPr>
-        <p:spPr/>
-        <p:txBody>
-          <a:bodyPr/>
-          <a:lstStyle/>
-          <a:p>
-            <a:fld id="{8ABD9A93-A63E-4048-A90A-76F0C4F81214}" type="slidenum">
-              <a:rPr lang="en-US" smtClean="0"/>
-              <a:t>2</a:t>
-            </a:fld>
-            <a:endParaRPr lang="en-US"/>
-          </a:p>
-        </p:txBody>
-      </p:sp>
-    </p:spTree>
-    <p:extLst>
-      <p:ext uri="{BB962C8B-B14F-4D97-AF65-F5344CB8AC3E}">
-        <p14:creationId xmlns:p14="http://schemas.microsoft.com/office/powerpoint/2010/main" val="138582175"/>
-      </p:ext>
-    </p:extLst>
-  </p:cSld>
-  <p:clrMapOvr>
-    <a:masterClrMapping/>
-  </p:clrMapOvr>
-</p:sld>
-</file>
-
-<file path=ppt/slides/slide20.xml><?xml version="1.0" encoding="utf-8"?>
+<file path=ppt/slides/slide28.xml><?xml version="1.0" encoding="utf-8"?>
 <p:sld xmlns:a="http://schemas.openxmlformats.org/drawingml/2006/main" xmlns:r="http://schemas.openxmlformats.org/officeDocument/2006/relationships" xmlns:p="http://schemas.openxmlformats.org/presentationml/2006/main">
   <p:cSld>
     <p:spTree>
@@ -7592,7 +8537,7 @@
 </p:sld>
 </file>
 
-<file path=ppt/slides/slide21.xml><?xml version="1.0" encoding="utf-8"?>
+<file path=ppt/slides/slide29.xml><?xml version="1.0" encoding="utf-8"?>
 <p:sld xmlns:a="http://schemas.openxmlformats.org/drawingml/2006/main" xmlns:r="http://schemas.openxmlformats.org/officeDocument/2006/relationships" xmlns:p="http://schemas.openxmlformats.org/presentationml/2006/main">
   <p:cSld>
     <p:spTree>

</xml_diff>